<commit_message>
poster draft for OM and WD review
</commit_message>
<xml_diff>
--- a/poster/conference_poster.pptx
+++ b/poster/conference_poster.pptx
@@ -208,7 +208,7 @@
           <a:p>
             <a:fld id="{918B625B-38C8-4009-8750-46B8B40D6DF5}" type="datetimeFigureOut">
               <a:rPr lang="en-US" smtClean="0"/>
-              <a:t>3/17/23</a:t>
+              <a:t>3/18/23</a:t>
             </a:fld>
             <a:endParaRPr lang="en-US"/>
           </a:p>
@@ -1596,7 +1596,7 @@
           <a:p>
             <a:fld id="{D609B0B8-55F0-4931-858A-9699256CDE40}" type="datetimeFigureOut">
               <a:rPr lang="en-US" smtClean="0"/>
-              <a:t>3/17/23</a:t>
+              <a:t>3/18/23</a:t>
             </a:fld>
             <a:endParaRPr lang="en-US"/>
           </a:p>
@@ -1764,7 +1764,7 @@
           <a:p>
             <a:fld id="{D609B0B8-55F0-4931-858A-9699256CDE40}" type="datetimeFigureOut">
               <a:rPr lang="en-US" smtClean="0"/>
-              <a:t>3/17/23</a:t>
+              <a:t>3/18/23</a:t>
             </a:fld>
             <a:endParaRPr lang="en-US"/>
           </a:p>
@@ -1942,7 +1942,7 @@
           <a:p>
             <a:fld id="{D609B0B8-55F0-4931-858A-9699256CDE40}" type="datetimeFigureOut">
               <a:rPr lang="en-US" smtClean="0"/>
-              <a:t>3/17/23</a:t>
+              <a:t>3/18/23</a:t>
             </a:fld>
             <a:endParaRPr lang="en-US"/>
           </a:p>
@@ -2182,7 +2182,7 @@
           <a:p>
             <a:fld id="{D609B0B8-55F0-4931-858A-9699256CDE40}" type="datetimeFigureOut">
               <a:rPr lang="en-US" smtClean="0"/>
-              <a:t>3/17/23</a:t>
+              <a:t>3/18/23</a:t>
             </a:fld>
             <a:endParaRPr lang="en-US"/>
           </a:p>
@@ -2350,7 +2350,7 @@
           <a:p>
             <a:fld id="{D609B0B8-55F0-4931-858A-9699256CDE40}" type="datetimeFigureOut">
               <a:rPr lang="en-US" smtClean="0"/>
-              <a:t>3/17/23</a:t>
+              <a:t>3/18/23</a:t>
             </a:fld>
             <a:endParaRPr lang="en-US"/>
           </a:p>
@@ -2595,7 +2595,7 @@
           <a:p>
             <a:fld id="{D609B0B8-55F0-4931-858A-9699256CDE40}" type="datetimeFigureOut">
               <a:rPr lang="en-US" smtClean="0"/>
-              <a:t>3/17/23</a:t>
+              <a:t>3/18/23</a:t>
             </a:fld>
             <a:endParaRPr lang="en-US"/>
           </a:p>
@@ -2880,7 +2880,7 @@
           <a:p>
             <a:fld id="{D609B0B8-55F0-4931-858A-9699256CDE40}" type="datetimeFigureOut">
               <a:rPr lang="en-US" smtClean="0"/>
-              <a:t>3/17/23</a:t>
+              <a:t>3/18/23</a:t>
             </a:fld>
             <a:endParaRPr lang="en-US"/>
           </a:p>
@@ -3299,7 +3299,7 @@
           <a:p>
             <a:fld id="{D609B0B8-55F0-4931-858A-9699256CDE40}" type="datetimeFigureOut">
               <a:rPr lang="en-US" smtClean="0"/>
-              <a:t>3/17/23</a:t>
+              <a:t>3/18/23</a:t>
             </a:fld>
             <a:endParaRPr lang="en-US"/>
           </a:p>
@@ -3416,7 +3416,7 @@
           <a:p>
             <a:fld id="{D609B0B8-55F0-4931-858A-9699256CDE40}" type="datetimeFigureOut">
               <a:rPr lang="en-US" smtClean="0"/>
-              <a:t>3/17/23</a:t>
+              <a:t>3/18/23</a:t>
             </a:fld>
             <a:endParaRPr lang="en-US"/>
           </a:p>
@@ -3511,7 +3511,7 @@
           <a:p>
             <a:fld id="{D609B0B8-55F0-4931-858A-9699256CDE40}" type="datetimeFigureOut">
               <a:rPr lang="en-US" smtClean="0"/>
-              <a:t>3/17/23</a:t>
+              <a:t>3/18/23</a:t>
             </a:fld>
             <a:endParaRPr lang="en-US"/>
           </a:p>
@@ -3786,7 +3786,7 @@
           <a:p>
             <a:fld id="{D609B0B8-55F0-4931-858A-9699256CDE40}" type="datetimeFigureOut">
               <a:rPr lang="en-US" smtClean="0"/>
-              <a:t>3/17/23</a:t>
+              <a:t>3/18/23</a:t>
             </a:fld>
             <a:endParaRPr lang="en-US"/>
           </a:p>
@@ -4008,7 +4008,7 @@
           <a:p>
             <a:fld id="{D609B0B8-55F0-4931-858A-9699256CDE40}" type="datetimeFigureOut">
               <a:rPr lang="en-US" smtClean="0"/>
-              <a:t>3/17/23</a:t>
+              <a:t>3/18/23</a:t>
             </a:fld>
             <a:endParaRPr lang="en-US"/>
           </a:p>
@@ -4880,7 +4880,7 @@
         <p:spPr>
           <a:xfrm>
             <a:off x="43514" y="172769"/>
-            <a:ext cx="7340164" cy="2062103"/>
+            <a:ext cx="7340164" cy="2246769"/>
           </a:xfrm>
           <a:prstGeom prst="rect">
             <a:avLst/>
@@ -4894,7 +4894,7 @@
           <a:lstStyle/>
           <a:p>
             <a:r>
-              <a:rPr lang="en-US" sz="3200" b="1" i="1" dirty="0">
+              <a:rPr lang="en-US" sz="3600" b="1" i="1" dirty="0">
                 <a:latin typeface="Avenir Book" panose="02000503020000020003" pitchFamily="2" charset="0"/>
                 <a:cs typeface="Segoe UI" panose="020B0502040204020203" pitchFamily="34" charset="0"/>
               </a:rPr>
@@ -4947,12 +4947,8 @@
             </a:endParaRPr>
           </a:p>
           <a:p>
-            <a:pPr marL="366713" indent="-366713">
-              <a:buFont typeface="Arial" panose="020B0604020202020204" pitchFamily="34" charset="0"/>
-              <a:buChar char="•"/>
-            </a:pPr>
-            <a:r>
-              <a:rPr lang="en-US" sz="2400" dirty="0">
+            <a:r>
+              <a:rPr lang="en-US" sz="2400" b="1" dirty="0">
                 <a:latin typeface="Avenir Book" panose="02000503020000020003" pitchFamily="2" charset="0"/>
                 <a:cs typeface="Segoe UI" panose="020B0502040204020203" pitchFamily="34" charset="0"/>
               </a:rPr>
@@ -5002,12 +4998,9 @@
             </a:r>
           </a:p>
           <a:p>
-            <a:pPr marL="422275" indent="-361950">
-              <a:buFont typeface="Arial" panose="020B0604020202020204" pitchFamily="34" charset="0"/>
-              <a:buChar char="•"/>
-            </a:pPr>
-            <a:r>
-              <a:rPr lang="en-US" sz="2400" dirty="0">
+            <a:pPr marL="60325"/>
+            <a:r>
+              <a:rPr lang="en-US" sz="2400" b="1" dirty="0">
                 <a:latin typeface="Avenir Book" panose="02000503020000020003" pitchFamily="2" charset="0"/>
                 <a:cs typeface="Segoe UI" panose="020B0502040204020203" pitchFamily="34" charset="0"/>
               </a:rPr>
@@ -5481,13 +5474,20 @@
           <a:lstStyle/>
           <a:p>
             <a:r>
-              <a:rPr lang="en-US" sz="2400" b="0" dirty="0">
+              <a:rPr lang="en-US" sz="2400" b="1" dirty="0">
                 <a:effectLst/>
                 <a:latin typeface="Avenir Book" panose="02000503020000020003" pitchFamily="2" charset="0"/>
               </a:rPr>
-              <a:t>Elastic net regularization (Zou &amp; Hastie, 2005) </a:t>
-            </a:r>
-            <a:endParaRPr lang="en-US" sz="2400" dirty="0">
+              <a:t>Elastic net regularization </a:t>
+            </a:r>
+            <a:r>
+              <a:rPr lang="en-US" sz="1600" b="0" dirty="0">
+                <a:effectLst/>
+                <a:latin typeface="Avenir Book" panose="02000503020000020003" pitchFamily="2" charset="0"/>
+              </a:rPr>
+              <a:t>(Zou &amp; Hastie, 2005) </a:t>
+            </a:r>
+            <a:endParaRPr lang="en-US" sz="1600" dirty="0">
               <a:effectLst/>
               <a:latin typeface="Avenir Book" panose="02000503020000020003" pitchFamily="2" charset="0"/>
             </a:endParaRPr>
@@ -5510,7 +5510,7 @@
           </a:p>
           <a:p>
             <a:r>
-              <a:rPr lang="en-US" sz="2400" dirty="0">
+              <a:rPr lang="en-US" sz="2400" b="1" dirty="0">
                 <a:latin typeface="Avenir Book" panose="02000503020000020003" pitchFamily="2" charset="0"/>
               </a:rPr>
               <a:t>Random forest</a:t>
@@ -5735,10 +5735,10 @@
       </p:sp>
       <p:pic>
         <p:nvPicPr>
-          <p:cNvPr id="16" name="Picture 15">
+          <p:cNvPr id="20" name="Picture 19">
             <a:extLst>
               <a:ext uri="{FF2B5EF4-FFF2-40B4-BE49-F238E27FC236}">
-                <a16:creationId xmlns:a16="http://schemas.microsoft.com/office/drawing/2014/main" id="{A1D67B96-D40F-942A-6693-5831216701A5}"/>
+                <a16:creationId xmlns:a16="http://schemas.microsoft.com/office/drawing/2014/main" id="{52790EC4-08F1-029F-A405-D392B6A54C13}"/>
               </a:ext>
             </a:extLst>
           </p:cNvPr>
@@ -5755,14 +5755,149 @@
         </p:blipFill>
         <p:spPr>
           <a:xfrm>
-            <a:off x="7993095" y="394362"/>
-            <a:ext cx="11361383" cy="17042076"/>
+            <a:off x="8197702" y="2837350"/>
+            <a:ext cx="10102210" cy="15153314"/>
           </a:xfrm>
           <a:prstGeom prst="rect">
             <a:avLst/>
           </a:prstGeom>
         </p:spPr>
       </p:pic>
+      <p:sp>
+        <p:nvSpPr>
+          <p:cNvPr id="22" name="TextBox 21">
+            <a:extLst>
+              <a:ext uri="{FF2B5EF4-FFF2-40B4-BE49-F238E27FC236}">
+                <a16:creationId xmlns:a16="http://schemas.microsoft.com/office/drawing/2014/main" id="{13529096-B255-E76D-5004-CDF8AFE29E8B}"/>
+              </a:ext>
+            </a:extLst>
+          </p:cNvPr>
+          <p:cNvSpPr txBox="1"/>
+          <p:nvPr/>
+        </p:nvSpPr>
+        <p:spPr>
+          <a:xfrm>
+            <a:off x="7877454" y="343585"/>
+            <a:ext cx="3179075" cy="707886"/>
+          </a:xfrm>
+          <a:prstGeom prst="rect">
+            <a:avLst/>
+          </a:prstGeom>
+          <a:noFill/>
+        </p:spPr>
+        <p:txBody>
+          <a:bodyPr wrap="none" rtlCol="0">
+            <a:spAutoFit/>
+          </a:bodyPr>
+          <a:lstStyle/>
+          <a:p>
+            <a:r>
+              <a:rPr lang="en-US" sz="4000" b="1" dirty="0">
+                <a:solidFill>
+                  <a:srgbClr val="0021A5"/>
+                </a:solidFill>
+                <a:latin typeface="Avenir Book" panose="02000503020000020003" pitchFamily="2" charset="0"/>
+              </a:rPr>
+              <a:t>WORKFLOW</a:t>
+            </a:r>
+          </a:p>
+        </p:txBody>
+      </p:sp>
+      <p:sp>
+        <p:nvSpPr>
+          <p:cNvPr id="23" name="TextBox 22">
+            <a:extLst>
+              <a:ext uri="{FF2B5EF4-FFF2-40B4-BE49-F238E27FC236}">
+                <a16:creationId xmlns:a16="http://schemas.microsoft.com/office/drawing/2014/main" id="{9C6308CB-30F6-41BE-F636-7781E9CFDAC8}"/>
+              </a:ext>
+            </a:extLst>
+          </p:cNvPr>
+          <p:cNvSpPr txBox="1"/>
+          <p:nvPr/>
+        </p:nvSpPr>
+        <p:spPr>
+          <a:xfrm>
+            <a:off x="7863085" y="1081001"/>
+            <a:ext cx="7651773" cy="2308324"/>
+          </a:xfrm>
+          <a:prstGeom prst="rect">
+            <a:avLst/>
+          </a:prstGeom>
+          <a:noFill/>
+        </p:spPr>
+        <p:txBody>
+          <a:bodyPr wrap="square" rtlCol="0">
+            <a:spAutoFit/>
+          </a:bodyPr>
+          <a:lstStyle/>
+          <a:p>
+            <a:pPr algn="ctr"/>
+            <a:r>
+              <a:rPr lang="en-US" sz="2400" dirty="0">
+                <a:solidFill>
+                  <a:srgbClr val="0021A5"/>
+                </a:solidFill>
+                <a:latin typeface="Avenir Book" panose="02000503020000020003" pitchFamily="2" charset="0"/>
+              </a:rPr>
+              <a:t>Using a </a:t>
+            </a:r>
+            <a:r>
+              <a:rPr lang="en-US" sz="2400" dirty="0" err="1">
+                <a:solidFill>
+                  <a:srgbClr val="0021A5"/>
+                </a:solidFill>
+                <a:latin typeface="Avenir Book" panose="02000503020000020003" pitchFamily="2" charset="0"/>
+              </a:rPr>
+              <a:t>Tidymodels</a:t>
+            </a:r>
+            <a:r>
+              <a:rPr lang="en-US" sz="2400" dirty="0">
+                <a:solidFill>
+                  <a:srgbClr val="0021A5"/>
+                </a:solidFill>
+                <a:latin typeface="Avenir Book" panose="02000503020000020003" pitchFamily="2" charset="0"/>
+              </a:rPr>
+              <a:t> workflow </a:t>
+            </a:r>
+            <a:r>
+              <a:rPr lang="en-US" sz="1600" dirty="0">
+                <a:solidFill>
+                  <a:srgbClr val="0021A5"/>
+                </a:solidFill>
+                <a:latin typeface="Avenir Book" panose="02000503020000020003" pitchFamily="2" charset="0"/>
+              </a:rPr>
+              <a:t>(Kuhn and </a:t>
+            </a:r>
+            <a:r>
+              <a:rPr lang="en-US" sz="1600" dirty="0" err="1">
+                <a:solidFill>
+                  <a:srgbClr val="0021A5"/>
+                </a:solidFill>
+                <a:latin typeface="Avenir Book" panose="02000503020000020003" pitchFamily="2" charset="0"/>
+              </a:rPr>
+              <a:t>Silge</a:t>
+            </a:r>
+            <a:r>
+              <a:rPr lang="en-US" sz="1600" dirty="0">
+                <a:solidFill>
+                  <a:srgbClr val="0021A5"/>
+                </a:solidFill>
+                <a:latin typeface="Avenir Book" panose="02000503020000020003" pitchFamily="2" charset="0"/>
+              </a:rPr>
+              <a:t>, 2022</a:t>
+            </a:r>
+            <a:r>
+              <a:rPr lang="en-US" sz="2400" dirty="0">
+                <a:solidFill>
+                  <a:srgbClr val="0021A5"/>
+                </a:solidFill>
+                <a:latin typeface="Avenir Book" panose="02000503020000020003" pitchFamily="2" charset="0"/>
+              </a:rPr>
+              <a:t>) in the R language, we preprocess our data and perform analyses following a standardized recipe structure that allows for transparent parameter tuning and model adjustments. Below is example code for our random forest model.</a:t>
+            </a:r>
+          </a:p>
+        </p:txBody>
+      </p:sp>
     </p:spTree>
     <p:extLst>
       <p:ext uri="{BB962C8B-B14F-4D97-AF65-F5344CB8AC3E}">

</xml_diff>